<commit_message>
Updated topology connector documentation
</commit_message>
<xml_diff>
--- a/EV3 Loom/EV3_Loom_Topology_V2_RCH.pptx
+++ b/EV3 Loom/EV3_Loom_Topology_V2_RCH.pptx
@@ -243,7 +243,7 @@
           <a:p>
             <a:fld id="{1102291F-AE0F-41BE-B119-27851E3C0948}" type="datetimeFigureOut">
               <a:rPr lang="en-AU" smtClean="0"/>
-              <a:t>9/02/2021</a:t>
+              <a:t>15/02/2021</a:t>
             </a:fld>
             <a:endParaRPr lang="en-AU"/>
           </a:p>
@@ -413,7 +413,7 @@
           <a:p>
             <a:fld id="{1102291F-AE0F-41BE-B119-27851E3C0948}" type="datetimeFigureOut">
               <a:rPr lang="en-AU" smtClean="0"/>
-              <a:t>9/02/2021</a:t>
+              <a:t>15/02/2021</a:t>
             </a:fld>
             <a:endParaRPr lang="en-AU"/>
           </a:p>
@@ -593,7 +593,7 @@
           <a:p>
             <a:fld id="{1102291F-AE0F-41BE-B119-27851E3C0948}" type="datetimeFigureOut">
               <a:rPr lang="en-AU" smtClean="0"/>
-              <a:t>9/02/2021</a:t>
+              <a:t>15/02/2021</a:t>
             </a:fld>
             <a:endParaRPr lang="en-AU"/>
           </a:p>
@@ -763,7 +763,7 @@
           <a:p>
             <a:fld id="{1102291F-AE0F-41BE-B119-27851E3C0948}" type="datetimeFigureOut">
               <a:rPr lang="en-AU" smtClean="0"/>
-              <a:t>9/02/2021</a:t>
+              <a:t>15/02/2021</a:t>
             </a:fld>
             <a:endParaRPr lang="en-AU"/>
           </a:p>
@@ -1007,7 +1007,7 @@
           <a:p>
             <a:fld id="{1102291F-AE0F-41BE-B119-27851E3C0948}" type="datetimeFigureOut">
               <a:rPr lang="en-AU" smtClean="0"/>
-              <a:t>9/02/2021</a:t>
+              <a:t>15/02/2021</a:t>
             </a:fld>
             <a:endParaRPr lang="en-AU"/>
           </a:p>
@@ -1239,7 +1239,7 @@
           <a:p>
             <a:fld id="{1102291F-AE0F-41BE-B119-27851E3C0948}" type="datetimeFigureOut">
               <a:rPr lang="en-AU" smtClean="0"/>
-              <a:t>9/02/2021</a:t>
+              <a:t>15/02/2021</a:t>
             </a:fld>
             <a:endParaRPr lang="en-AU"/>
           </a:p>
@@ -1606,7 +1606,7 @@
           <a:p>
             <a:fld id="{1102291F-AE0F-41BE-B119-27851E3C0948}" type="datetimeFigureOut">
               <a:rPr lang="en-AU" smtClean="0"/>
-              <a:t>9/02/2021</a:t>
+              <a:t>15/02/2021</a:t>
             </a:fld>
             <a:endParaRPr lang="en-AU"/>
           </a:p>
@@ -1724,7 +1724,7 @@
           <a:p>
             <a:fld id="{1102291F-AE0F-41BE-B119-27851E3C0948}" type="datetimeFigureOut">
               <a:rPr lang="en-AU" smtClean="0"/>
-              <a:t>9/02/2021</a:t>
+              <a:t>15/02/2021</a:t>
             </a:fld>
             <a:endParaRPr lang="en-AU"/>
           </a:p>
@@ -1819,7 +1819,7 @@
           <a:p>
             <a:fld id="{1102291F-AE0F-41BE-B119-27851E3C0948}" type="datetimeFigureOut">
               <a:rPr lang="en-AU" smtClean="0"/>
-              <a:t>9/02/2021</a:t>
+              <a:t>15/02/2021</a:t>
             </a:fld>
             <a:endParaRPr lang="en-AU"/>
           </a:p>
@@ -2096,7 +2096,7 @@
           <a:p>
             <a:fld id="{1102291F-AE0F-41BE-B119-27851E3C0948}" type="datetimeFigureOut">
               <a:rPr lang="en-AU" smtClean="0"/>
-              <a:t>9/02/2021</a:t>
+              <a:t>15/02/2021</a:t>
             </a:fld>
             <a:endParaRPr lang="en-AU"/>
           </a:p>
@@ -2353,7 +2353,7 @@
           <a:p>
             <a:fld id="{1102291F-AE0F-41BE-B119-27851E3C0948}" type="datetimeFigureOut">
               <a:rPr lang="en-AU" smtClean="0"/>
-              <a:t>9/02/2021</a:t>
+              <a:t>15/02/2021</a:t>
             </a:fld>
             <a:endParaRPr lang="en-AU"/>
           </a:p>
@@ -2566,7 +2566,7 @@
           <a:p>
             <a:fld id="{1102291F-AE0F-41BE-B119-27851E3C0948}" type="datetimeFigureOut">
               <a:rPr lang="en-AU" smtClean="0"/>
-              <a:t>9/02/2021</a:t>
+              <a:t>15/02/2021</a:t>
             </a:fld>
             <a:endParaRPr lang="en-AU"/>
           </a:p>
@@ -3250,6 +3250,9 @@
           <a:prstGeom prst="ellipse">
             <a:avLst/>
           </a:prstGeom>
+          <a:solidFill>
+            <a:schemeClr val="bg2"/>
+          </a:solidFill>
         </p:spPr>
         <p:style>
           <a:lnRef idx="2">
@@ -3416,6 +3419,9 @@
           <a:prstGeom prst="ellipse">
             <a:avLst/>
           </a:prstGeom>
+          <a:solidFill>
+            <a:schemeClr val="bg2"/>
+          </a:solidFill>
         </p:spPr>
         <p:style>
           <a:lnRef idx="2">
@@ -3463,6 +3469,9 @@
           <a:prstGeom prst="ellipse">
             <a:avLst/>
           </a:prstGeom>
+          <a:solidFill>
+            <a:schemeClr val="bg2"/>
+          </a:solidFill>
         </p:spPr>
         <p:style>
           <a:lnRef idx="2">
@@ -3700,6 +3709,9 @@
           <a:prstGeom prst="ellipse">
             <a:avLst/>
           </a:prstGeom>
+          <a:solidFill>
+            <a:schemeClr val="bg2"/>
+          </a:solidFill>
         </p:spPr>
         <p:style>
           <a:lnRef idx="2">
@@ -4133,6 +4145,9 @@
           <a:prstGeom prst="ellipse">
             <a:avLst/>
           </a:prstGeom>
+          <a:solidFill>
+            <a:schemeClr val="bg2"/>
+          </a:solidFill>
         </p:spPr>
         <p:style>
           <a:lnRef idx="2">
@@ -4180,6 +4195,9 @@
           <a:prstGeom prst="ellipse">
             <a:avLst/>
           </a:prstGeom>
+          <a:solidFill>
+            <a:schemeClr val="bg2"/>
+          </a:solidFill>
         </p:spPr>
         <p:style>
           <a:lnRef idx="2">

</xml_diff>